<commit_message>
start VMs for people
</commit_message>
<xml_diff>
--- a/VM_list.pptx
+++ b/VM_list.pptx
@@ -104,6 +104,11 @@
       </a:defRPr>
     </a:lvl9pPr>
   </p:defaultTextStyle>
+  <p:extLst>
+    <p:ext uri="{EFAFB233-063F-42B5-8137-9DF3F51BA10A}">
+      <p15:sldGuideLst xmlns:p15="http://schemas.microsoft.com/office/powerpoint/2012/main"/>
+    </p:ext>
+  </p:extLst>
 </p:presentation>
 </file>
 
@@ -254,7 +259,7 @@
           <a:p>
             <a:fld id="{D3C40103-25B8-4520-8D7C-AE2771C78947}" type="datetimeFigureOut">
               <a:rPr lang="en-US" smtClean="0"/>
-              <a:t>8/30/2021</a:t>
+              <a:t>9/14/2021</a:t>
             </a:fld>
             <a:endParaRPr lang="en-US"/>
           </a:p>
@@ -452,7 +457,7 @@
           <a:p>
             <a:fld id="{D3C40103-25B8-4520-8D7C-AE2771C78947}" type="datetimeFigureOut">
               <a:rPr lang="en-US" smtClean="0"/>
-              <a:t>8/30/2021</a:t>
+              <a:t>9/14/2021</a:t>
             </a:fld>
             <a:endParaRPr lang="en-US"/>
           </a:p>
@@ -660,7 +665,7 @@
           <a:p>
             <a:fld id="{D3C40103-25B8-4520-8D7C-AE2771C78947}" type="datetimeFigureOut">
               <a:rPr lang="en-US" smtClean="0"/>
-              <a:t>8/30/2021</a:t>
+              <a:t>9/14/2021</a:t>
             </a:fld>
             <a:endParaRPr lang="en-US"/>
           </a:p>
@@ -858,7 +863,7 @@
           <a:p>
             <a:fld id="{D3C40103-25B8-4520-8D7C-AE2771C78947}" type="datetimeFigureOut">
               <a:rPr lang="en-US" smtClean="0"/>
-              <a:t>8/30/2021</a:t>
+              <a:t>9/14/2021</a:t>
             </a:fld>
             <a:endParaRPr lang="en-US"/>
           </a:p>
@@ -1133,7 +1138,7 @@
           <a:p>
             <a:fld id="{D3C40103-25B8-4520-8D7C-AE2771C78947}" type="datetimeFigureOut">
               <a:rPr lang="en-US" smtClean="0"/>
-              <a:t>8/30/2021</a:t>
+              <a:t>9/14/2021</a:t>
             </a:fld>
             <a:endParaRPr lang="en-US"/>
           </a:p>
@@ -1398,7 +1403,7 @@
           <a:p>
             <a:fld id="{D3C40103-25B8-4520-8D7C-AE2771C78947}" type="datetimeFigureOut">
               <a:rPr lang="en-US" smtClean="0"/>
-              <a:t>8/30/2021</a:t>
+              <a:t>9/14/2021</a:t>
             </a:fld>
             <a:endParaRPr lang="en-US"/>
           </a:p>
@@ -1810,7 +1815,7 @@
           <a:p>
             <a:fld id="{D3C40103-25B8-4520-8D7C-AE2771C78947}" type="datetimeFigureOut">
               <a:rPr lang="en-US" smtClean="0"/>
-              <a:t>8/30/2021</a:t>
+              <a:t>9/14/2021</a:t>
             </a:fld>
             <a:endParaRPr lang="en-US"/>
           </a:p>
@@ -1951,7 +1956,7 @@
           <a:p>
             <a:fld id="{D3C40103-25B8-4520-8D7C-AE2771C78947}" type="datetimeFigureOut">
               <a:rPr lang="en-US" smtClean="0"/>
-              <a:t>8/30/2021</a:t>
+              <a:t>9/14/2021</a:t>
             </a:fld>
             <a:endParaRPr lang="en-US"/>
           </a:p>
@@ -2064,7 +2069,7 @@
           <a:p>
             <a:fld id="{D3C40103-25B8-4520-8D7C-AE2771C78947}" type="datetimeFigureOut">
               <a:rPr lang="en-US" smtClean="0"/>
-              <a:t>8/30/2021</a:t>
+              <a:t>9/14/2021</a:t>
             </a:fld>
             <a:endParaRPr lang="en-US"/>
           </a:p>
@@ -2375,7 +2380,7 @@
           <a:p>
             <a:fld id="{D3C40103-25B8-4520-8D7C-AE2771C78947}" type="datetimeFigureOut">
               <a:rPr lang="en-US" smtClean="0"/>
-              <a:t>8/30/2021</a:t>
+              <a:t>9/14/2021</a:t>
             </a:fld>
             <a:endParaRPr lang="en-US"/>
           </a:p>
@@ -2663,7 +2668,7 @@
           <a:p>
             <a:fld id="{D3C40103-25B8-4520-8D7C-AE2771C78947}" type="datetimeFigureOut">
               <a:rPr lang="en-US" smtClean="0"/>
-              <a:t>8/30/2021</a:t>
+              <a:t>9/14/2021</a:t>
             </a:fld>
             <a:endParaRPr lang="en-US"/>
           </a:p>
@@ -2904,7 +2909,7 @@
           <a:p>
             <a:fld id="{D3C40103-25B8-4520-8D7C-AE2771C78947}" type="datetimeFigureOut">
               <a:rPr lang="en-US" smtClean="0"/>
-              <a:t>8/30/2021</a:t>
+              <a:t>9/14/2021</a:t>
             </a:fld>
             <a:endParaRPr lang="en-US"/>
           </a:p>
@@ -3336,14 +3341,14 @@
           <p:nvPr>
             <p:extLst>
               <p:ext uri="{D42A27DB-BD31-4B8C-83A1-F6EECF244321}">
-                <p14:modId xmlns:p14="http://schemas.microsoft.com/office/powerpoint/2010/main" val="2805985877"/>
+                <p14:modId xmlns:p14="http://schemas.microsoft.com/office/powerpoint/2010/main" val="244305183"/>
               </p:ext>
             </p:extLst>
           </p:nvPr>
         </p:nvGraphicFramePr>
         <p:xfrm>
           <a:off x="227692" y="0"/>
-          <a:ext cx="11545208" cy="6748470"/>
+          <a:ext cx="12050413" cy="6309368"/>
         </p:xfrm>
         <a:graphic>
           <a:graphicData uri="http://schemas.openxmlformats.org/drawingml/2006/table">
@@ -3352,28 +3357,28 @@
                 <a:tableStyleId>{5C22544A-7EE6-4342-B048-85BDC9FD1C3A}</a:tableStyleId>
               </a:tblPr>
               <a:tblGrid>
-                <a:gridCol w="4053968">
+                <a:gridCol w="4559173">
                   <a:extLst>
                     <a:ext uri="{9D8B030D-6E8A-4147-A177-3AD203B41FA5}">
                       <a16:colId xmlns:a16="http://schemas.microsoft.com/office/drawing/2014/main" val="1715314241"/>
                     </a:ext>
                   </a:extLst>
                 </a:gridCol>
-                <a:gridCol w="2852056">
+                <a:gridCol w="3263885">
                   <a:extLst>
                     <a:ext uri="{9D8B030D-6E8A-4147-A177-3AD203B41FA5}">
                       <a16:colId xmlns:a16="http://schemas.microsoft.com/office/drawing/2014/main" val="3577838668"/>
                     </a:ext>
                   </a:extLst>
                 </a:gridCol>
-                <a:gridCol w="2652458">
+                <a:gridCol w="2854882">
                   <a:extLst>
                     <a:ext uri="{9D8B030D-6E8A-4147-A177-3AD203B41FA5}">
                       <a16:colId xmlns:a16="http://schemas.microsoft.com/office/drawing/2014/main" val="2679333516"/>
                     </a:ext>
                   </a:extLst>
                 </a:gridCol>
-                <a:gridCol w="1986726">
+                <a:gridCol w="1372473">
                   <a:extLst>
                     <a:ext uri="{9D8B030D-6E8A-4147-A177-3AD203B41FA5}">
                       <a16:colId xmlns:a16="http://schemas.microsoft.com/office/drawing/2014/main" val="3777763601"/>
@@ -3389,7 +3394,7 @@
                     <a:p>
                       <a:pPr algn="ctr"/>
                       <a:r>
-                        <a:rPr lang="en-US" sz="2000" dirty="0"/>
+                        <a:rPr lang="en-US" sz="1200" dirty="0"/>
                         <a:t>Name</a:t>
                       </a:r>
                     </a:p>
@@ -3403,7 +3408,7 @@
                     <a:p>
                       <a:pPr algn="ctr"/>
                       <a:r>
-                        <a:rPr lang="en-US" sz="2000" dirty="0"/>
+                        <a:rPr lang="en-US" sz="1200" dirty="0"/>
                         <a:t>IP</a:t>
                       </a:r>
                     </a:p>
@@ -3417,7 +3422,7 @@
                     <a:p>
                       <a:pPr algn="ctr"/>
                       <a:r>
-                        <a:rPr lang="en-US" sz="2000" dirty="0"/>
+                        <a:rPr lang="en-US" sz="1200" dirty="0"/>
                         <a:t>User</a:t>
                       </a:r>
                     </a:p>
@@ -3431,7 +3436,7 @@
                     <a:p>
                       <a:pPr algn="ctr"/>
                       <a:r>
-                        <a:rPr lang="en-US" sz="2000" dirty="0"/>
+                        <a:rPr lang="en-US" sz="1200" dirty="0"/>
                         <a:t>Date</a:t>
                       </a:r>
                     </a:p>
@@ -3501,7 +3506,34 @@
                     <a:lstStyle/>
                     <a:p>
                       <a:pPr algn="ctr"/>
-                      <a:endParaRPr lang="en-US" sz="1400" dirty="0"/>
+                      <a:r>
+                        <a:rPr lang="en-US" sz="1200" b="0" i="0" kern="1200" dirty="0">
+                          <a:solidFill>
+                            <a:schemeClr val="dk1"/>
+                          </a:solidFill>
+                          <a:effectLst/>
+                          <a:latin typeface="+mn-lt"/>
+                          <a:ea typeface="+mn-ea"/>
+                          <a:cs typeface="+mn-cs"/>
+                        </a:rPr>
+                        <a:t>aviat.eastus.cloudapp.azure.com</a:t>
+                      </a:r>
+                    </a:p>
+                    <a:p>
+                      <a:pPr algn="ctr"/>
+                      <a:r>
+                        <a:rPr lang="en-US" sz="1200" b="0" i="0" kern="1200" dirty="0">
+                          <a:solidFill>
+                            <a:schemeClr val="dk1"/>
+                          </a:solidFill>
+                          <a:effectLst/>
+                          <a:latin typeface="+mn-lt"/>
+                          <a:ea typeface="+mn-ea"/>
+                          <a:cs typeface="+mn-cs"/>
+                        </a:rPr>
+                        <a:t>20.102.71.252</a:t>
+                      </a:r>
+                      <a:endParaRPr lang="en-US" sz="1200" dirty="0"/>
                     </a:p>
                   </a:txBody>
                   <a:tcPr anchor="ctr"/>
@@ -3512,7 +3544,14 @@
                     <a:lstStyle/>
                     <a:p>
                       <a:pPr algn="ctr"/>
-                      <a:endParaRPr lang="en-US" sz="1400" dirty="0"/>
+                      <a:r>
+                        <a:rPr lang="en-US" sz="1200" dirty="0" err="1"/>
+                        <a:t>dlcc</a:t>
+                      </a:r>
+                      <a:r>
+                        <a:rPr lang="en-US" sz="1200" dirty="0"/>
+                        <a:t>, dlcc789)_+dlcc789)_+</a:t>
+                      </a:r>
                     </a:p>
                   </a:txBody>
                   <a:tcPr anchor="ctr"/>
@@ -3523,7 +3562,10 @@
                     <a:lstStyle/>
                     <a:p>
                       <a:pPr algn="ctr"/>
-                      <a:endParaRPr lang="en-US" sz="1400" dirty="0"/>
+                      <a:r>
+                        <a:rPr lang="en-US" sz="1200" dirty="0"/>
+                        <a:t>9/14/2021</a:t>
+                      </a:r>
                     </a:p>
                   </a:txBody>
                   <a:tcPr anchor="ctr"/>
@@ -3615,40 +3657,38 @@
                     <a:lstStyle/>
                     <a:p>
                       <a:pPr algn="ctr"/>
-                      <a:endParaRPr lang="en-US" sz="1400" dirty="0"/>
+                      <a:r>
+                        <a:rPr lang="en-US" sz="1200" b="0" i="0" kern="1200" dirty="0">
+                          <a:solidFill>
+                            <a:schemeClr val="dk1"/>
+                          </a:solidFill>
+                          <a:effectLst/>
+                          <a:latin typeface="+mn-lt"/>
+                          <a:ea typeface="+mn-ea"/>
+                          <a:cs typeface="+mn-cs"/>
+                        </a:rPr>
+                        <a:t>underbayev.eastus.cloudapp.azure.com</a:t>
+                      </a:r>
+                    </a:p>
+                    <a:p>
+                      <a:pPr algn="ctr"/>
+                      <a:r>
+                        <a:rPr lang="en-US" sz="1200" b="0" i="0" kern="1200" dirty="0">
+                          <a:solidFill>
+                            <a:schemeClr val="dk1"/>
+                          </a:solidFill>
+                          <a:effectLst/>
+                          <a:latin typeface="+mn-lt"/>
+                          <a:ea typeface="+mn-ea"/>
+                          <a:cs typeface="+mn-cs"/>
+                        </a:rPr>
+                        <a:t>20.102.64.29</a:t>
+                      </a:r>
+                      <a:endParaRPr lang="en-US" sz="1200" dirty="0"/>
                     </a:p>
                   </a:txBody>
                   <a:tcPr anchor="ctr"/>
                 </a:tc>
-                <a:tc>
-                  <a:txBody>
-                    <a:bodyPr/>
-                    <a:lstStyle/>
-                    <a:p>
-                      <a:pPr algn="ctr"/>
-                      <a:endParaRPr lang="en-US" sz="1400" dirty="0"/>
-                    </a:p>
-                  </a:txBody>
-                  <a:tcPr anchor="ctr"/>
-                </a:tc>
-                <a:tc>
-                  <a:txBody>
-                    <a:bodyPr/>
-                    <a:lstStyle/>
-                    <a:p>
-                      <a:pPr algn="ctr"/>
-                      <a:endParaRPr lang="en-US" sz="1400" dirty="0"/>
-                    </a:p>
-                  </a:txBody>
-                  <a:tcPr anchor="ctr"/>
-                </a:tc>
-                <a:extLst>
-                  <a:ext uri="{0D108BD9-81ED-4DB2-BD59-A6C34878D82A}">
-                    <a16:rowId xmlns:a16="http://schemas.microsoft.com/office/drawing/2014/main" val="3505184625"/>
-                  </a:ext>
-                </a:extLst>
-              </a:tr>
-              <a:tr h="336165">
                 <a:tc>
                   <a:txBody>
                     <a:bodyPr/>
@@ -3672,16 +3712,38 @@
                         <a:defRPr/>
                       </a:pPr>
                       <a:r>
-                        <a:rPr lang="en-US" sz="1200" b="1" kern="1200" dirty="0">
-                          <a:solidFill>
-                            <a:schemeClr val="dk1"/>
-                          </a:solidFill>
-                          <a:effectLst/>
-                          <a:latin typeface="+mn-lt"/>
-                          <a:ea typeface="+mn-ea"/>
-                          <a:cs typeface="+mn-cs"/>
-                        </a:rPr>
-                        <a:t>Combs, Christian (NIH/NHLBI) [E] &lt;combsc@nhlbi.nih.gov&gt;</a:t>
+                        <a:rPr kumimoji="0" lang="en-US" sz="1200" b="0" i="0" u="none" strike="noStrike" kern="1200" cap="none" spc="0" normalizeH="0" baseline="0" noProof="0" dirty="0" err="1">
+                          <a:ln>
+                            <a:noFill/>
+                          </a:ln>
+                          <a:solidFill>
+                            <a:prstClr val="black"/>
+                          </a:solidFill>
+                          <a:effectLst/>
+                          <a:uLnTx/>
+                          <a:uFillTx/>
+                          <a:latin typeface="Calibri" panose="020F0502020204030204"/>
+                          <a:ea typeface="+mn-ea"/>
+                          <a:cs typeface="+mn-cs"/>
+                        </a:rPr>
+                        <a:t>dlcc</a:t>
+                      </a:r>
+                      <a:r>
+                        <a:rPr kumimoji="0" lang="en-US" sz="1200" b="0" i="0" u="none" strike="noStrike" kern="1200" cap="none" spc="0" normalizeH="0" baseline="0" noProof="0" dirty="0">
+                          <a:ln>
+                            <a:noFill/>
+                          </a:ln>
+                          <a:solidFill>
+                            <a:prstClr val="black"/>
+                          </a:solidFill>
+                          <a:effectLst/>
+                          <a:uLnTx/>
+                          <a:uFillTx/>
+                          <a:latin typeface="Calibri" panose="020F0502020204030204"/>
+                          <a:ea typeface="+mn-ea"/>
+                          <a:cs typeface="+mn-cs"/>
+                        </a:rPr>
+                        <a:t>, dlcc789)_+dlcc789)_+</a:t>
                       </a:r>
                     </a:p>
                   </a:txBody>
@@ -3692,9 +3754,62 @@
                     <a:bodyPr/>
                     <a:lstStyle/>
                     <a:p>
-                      <a:pPr algn="ctr"/>
-                      <a:r>
-                        <a:rPr lang="en-US" sz="1400" b="0" i="0" kern="1200" dirty="0">
+                      <a:pPr marL="0" marR="0" lvl="0" indent="0" algn="ctr" defTabSz="914400" rtl="0" eaLnBrk="1" fontAlgn="auto" latinLnBrk="0" hangingPunct="1">
+                        <a:lnSpc>
+                          <a:spcPct val="100000"/>
+                        </a:lnSpc>
+                        <a:spcBef>
+                          <a:spcPts val="0"/>
+                        </a:spcBef>
+                        <a:spcAft>
+                          <a:spcPts val="0"/>
+                        </a:spcAft>
+                        <a:buClrTx/>
+                        <a:buSzTx/>
+                        <a:buFontTx/>
+                        <a:buNone/>
+                        <a:tabLst/>
+                        <a:defRPr/>
+                      </a:pPr>
+                      <a:r>
+                        <a:rPr lang="en-US" sz="1200" dirty="0"/>
+                        <a:t>9/14/2021</a:t>
+                      </a:r>
+                    </a:p>
+                  </a:txBody>
+                  <a:tcPr anchor="ctr"/>
+                </a:tc>
+                <a:extLst>
+                  <a:ext uri="{0D108BD9-81ED-4DB2-BD59-A6C34878D82A}">
+                    <a16:rowId xmlns:a16="http://schemas.microsoft.com/office/drawing/2014/main" val="3505184625"/>
+                  </a:ext>
+                </a:extLst>
+              </a:tr>
+              <a:tr h="336165">
+                <a:tc>
+                  <a:txBody>
+                    <a:bodyPr/>
+                    <a:lstStyle/>
+                    <a:p>
+                      <a:pPr marL="0" marR="0" lvl="0" indent="0" algn="ctr" defTabSz="914400" rtl="0" eaLnBrk="1" fontAlgn="auto" latinLnBrk="0" hangingPunct="1">
+                        <a:lnSpc>
+                          <a:spcPct val="100000"/>
+                        </a:lnSpc>
+                        <a:spcBef>
+                          <a:spcPts val="0"/>
+                        </a:spcBef>
+                        <a:spcAft>
+                          <a:spcPts val="0"/>
+                        </a:spcAft>
+                        <a:buClrTx/>
+                        <a:buSzTx/>
+                        <a:buFontTx/>
+                        <a:buNone/>
+                        <a:tabLst/>
+                        <a:defRPr/>
+                      </a:pPr>
+                      <a:r>
+                        <a:rPr lang="en-US" sz="1200" b="1" kern="1200" dirty="0">
                           <a:solidFill>
                             <a:schemeClr val="dk1"/>
                           </a:solidFill>
@@ -3703,24 +3818,8 @@
                           <a:ea typeface="+mn-ea"/>
                           <a:cs typeface="+mn-cs"/>
                         </a:rPr>
-                        <a:t>combs-dlcc.eastus.cloudapp.azure.com</a:t>
-                      </a:r>
-                    </a:p>
-                    <a:p>
-                      <a:pPr algn="ctr"/>
-                      <a:r>
-                        <a:rPr lang="en-US" sz="1400" b="0" i="0" kern="1200" dirty="0">
-                          <a:solidFill>
-                            <a:schemeClr val="dk1"/>
-                          </a:solidFill>
-                          <a:effectLst/>
-                          <a:latin typeface="+mn-lt"/>
-                          <a:ea typeface="+mn-ea"/>
-                          <a:cs typeface="+mn-cs"/>
-                        </a:rPr>
-                        <a:t>20.102.120.41</a:t>
-                      </a:r>
-                      <a:endParaRPr lang="en-US" sz="1400" dirty="0"/>
+                        <a:t>Combs, Christian (NIH/NHLBI) [E] &lt;combsc@nhlbi.nih.gov&gt;</a:t>
+                      </a:r>
                     </a:p>
                   </a:txBody>
                   <a:tcPr anchor="ctr"/>
@@ -3732,20 +3831,33 @@
                     <a:p>
                       <a:pPr algn="ctr"/>
                       <a:r>
-                        <a:rPr lang="en-US" sz="1400" dirty="0" err="1"/>
-                        <a:t>dlcc</a:t>
-                      </a:r>
-                      <a:r>
-                        <a:rPr lang="en-US" sz="1400" dirty="0"/>
-                        <a:t>, </a:t>
+                        <a:rPr lang="en-US" sz="1200" b="0" i="0" kern="1200" dirty="0">
+                          <a:solidFill>
+                            <a:schemeClr val="dk1"/>
+                          </a:solidFill>
+                          <a:effectLst/>
+                          <a:latin typeface="+mn-lt"/>
+                          <a:ea typeface="+mn-ea"/>
+                          <a:cs typeface="+mn-cs"/>
+                        </a:rPr>
+                        <a:t>combs-dlcc.eastus.cloudapp.azure.com</a:t>
                       </a:r>
                     </a:p>
                     <a:p>
                       <a:pPr algn="ctr"/>
                       <a:r>
-                        <a:rPr lang="en-US" sz="1400" dirty="0"/>
-                        <a:t>dlcc789)_+dlcc789)_+</a:t>
-                      </a:r>
+                        <a:rPr lang="en-US" sz="1200" b="0" i="0" kern="1200" dirty="0">
+                          <a:solidFill>
+                            <a:schemeClr val="dk1"/>
+                          </a:solidFill>
+                          <a:effectLst/>
+                          <a:latin typeface="+mn-lt"/>
+                          <a:ea typeface="+mn-ea"/>
+                          <a:cs typeface="+mn-cs"/>
+                        </a:rPr>
+                        <a:t>20.102.120.41</a:t>
+                      </a:r>
+                      <a:endParaRPr lang="en-US" sz="1200" dirty="0"/>
                     </a:p>
                   </a:txBody>
                   <a:tcPr anchor="ctr"/>
@@ -3755,9 +3867,66 @@
                     <a:bodyPr/>
                     <a:lstStyle/>
                     <a:p>
+                      <a:pPr marL="0" marR="0" lvl="0" indent="0" algn="ctr" defTabSz="914400" rtl="0" eaLnBrk="1" fontAlgn="auto" latinLnBrk="0" hangingPunct="1">
+                        <a:lnSpc>
+                          <a:spcPct val="100000"/>
+                        </a:lnSpc>
+                        <a:spcBef>
+                          <a:spcPts val="0"/>
+                        </a:spcBef>
+                        <a:spcAft>
+                          <a:spcPts val="0"/>
+                        </a:spcAft>
+                        <a:buClrTx/>
+                        <a:buSzTx/>
+                        <a:buFontTx/>
+                        <a:buNone/>
+                        <a:tabLst/>
+                        <a:defRPr/>
+                      </a:pPr>
+                      <a:r>
+                        <a:rPr kumimoji="0" lang="en-US" sz="1200" b="0" i="0" u="none" strike="noStrike" kern="1200" cap="none" spc="0" normalizeH="0" baseline="0" noProof="0">
+                          <a:ln>
+                            <a:noFill/>
+                          </a:ln>
+                          <a:solidFill>
+                            <a:prstClr val="black"/>
+                          </a:solidFill>
+                          <a:effectLst/>
+                          <a:uLnTx/>
+                          <a:uFillTx/>
+                          <a:latin typeface="Calibri" panose="020F0502020204030204"/>
+                          <a:ea typeface="+mn-ea"/>
+                          <a:cs typeface="+mn-cs"/>
+                        </a:rPr>
+                        <a:t>dlcc, dlcc789)_+dlcc789)_+</a:t>
+                      </a:r>
+                      <a:endParaRPr kumimoji="0" lang="en-US" sz="1200" b="0" i="0" u="none" strike="noStrike" kern="1200" cap="none" spc="0" normalizeH="0" baseline="0" noProof="0" dirty="0">
+                        <a:ln>
+                          <a:noFill/>
+                        </a:ln>
+                        <a:solidFill>
+                          <a:prstClr val="black"/>
+                        </a:solidFill>
+                        <a:effectLst/>
+                        <a:uLnTx/>
+                        <a:uFillTx/>
+                        <a:latin typeface="Calibri" panose="020F0502020204030204"/>
+                        <a:ea typeface="+mn-ea"/>
+                        <a:cs typeface="+mn-cs"/>
+                      </a:endParaRPr>
+                    </a:p>
+                  </a:txBody>
+                  <a:tcPr anchor="ctr"/>
+                </a:tc>
+                <a:tc>
+                  <a:txBody>
+                    <a:bodyPr/>
+                    <a:lstStyle/>
+                    <a:p>
                       <a:pPr algn="ctr"/>
                       <a:r>
-                        <a:rPr lang="en-US" sz="1400" dirty="0"/>
+                        <a:rPr lang="en-US" sz="1200" dirty="0"/>
                         <a:t>8/30/2021</a:t>
                       </a:r>
                     </a:p>
@@ -3798,8 +3967,51 @@
                     <a:bodyPr/>
                     <a:lstStyle/>
                     <a:p>
+                      <a:pPr marL="0" marR="0" lvl="0" indent="0" algn="ctr" defTabSz="914400" rtl="0" eaLnBrk="1" fontAlgn="auto" latinLnBrk="0" hangingPunct="1">
+                        <a:lnSpc>
+                          <a:spcPct val="100000"/>
+                        </a:lnSpc>
+                        <a:spcBef>
+                          <a:spcPts val="0"/>
+                        </a:spcBef>
+                        <a:spcAft>
+                          <a:spcPts val="0"/>
+                        </a:spcAft>
+                        <a:buClrTx/>
+                        <a:buSzTx/>
+                        <a:buFontTx/>
+                        <a:buNone/>
+                        <a:tabLst/>
+                        <a:defRPr/>
+                      </a:pPr>
+                      <a:r>
+                        <a:rPr lang="en-US" sz="1200" b="0" i="0" kern="1200" dirty="0">
+                          <a:solidFill>
+                            <a:schemeClr val="dk1"/>
+                          </a:solidFill>
+                          <a:effectLst/>
+                          <a:latin typeface="+mn-lt"/>
+                          <a:ea typeface="+mn-ea"/>
+                          <a:cs typeface="+mn-cs"/>
+                        </a:rPr>
+                        <a:t>chen.eastus.cloudapp.azure.com</a:t>
+                      </a:r>
+                    </a:p>
+                    <a:p>
                       <a:pPr algn="ctr"/>
-                      <a:endParaRPr lang="en-US" sz="1400" dirty="0"/>
+                      <a:r>
+                        <a:rPr lang="en-US" sz="1200" b="0" i="0" kern="1200" dirty="0">
+                          <a:solidFill>
+                            <a:schemeClr val="dk1"/>
+                          </a:solidFill>
+                          <a:effectLst/>
+                          <a:latin typeface="+mn-lt"/>
+                          <a:ea typeface="+mn-ea"/>
+                          <a:cs typeface="+mn-cs"/>
+                        </a:rPr>
+                        <a:t>13.92.138.178</a:t>
+                      </a:r>
+                      <a:endParaRPr lang="en-US" sz="1200" dirty="0"/>
                     </a:p>
                   </a:txBody>
                   <a:tcPr anchor="ctr"/>
@@ -3809,8 +4021,57 @@
                     <a:bodyPr/>
                     <a:lstStyle/>
                     <a:p>
-                      <a:pPr algn="ctr"/>
-                      <a:endParaRPr lang="en-US" sz="1400" dirty="0"/>
+                      <a:pPr marL="0" marR="0" lvl="0" indent="0" algn="ctr" defTabSz="914400" rtl="0" eaLnBrk="1" fontAlgn="auto" latinLnBrk="0" hangingPunct="1">
+                        <a:lnSpc>
+                          <a:spcPct val="100000"/>
+                        </a:lnSpc>
+                        <a:spcBef>
+                          <a:spcPts val="0"/>
+                        </a:spcBef>
+                        <a:spcAft>
+                          <a:spcPts val="0"/>
+                        </a:spcAft>
+                        <a:buClrTx/>
+                        <a:buSzTx/>
+                        <a:buFontTx/>
+                        <a:buNone/>
+                        <a:tabLst/>
+                        <a:defRPr/>
+                      </a:pPr>
+                      <a:r>
+                        <a:rPr kumimoji="0" lang="en-US" sz="1200" b="0" i="0" u="none" strike="noStrike" kern="1200" cap="none" spc="0" normalizeH="0" baseline="0" noProof="0" dirty="0" err="1">
+                          <a:ln>
+                            <a:noFill/>
+                          </a:ln>
+                          <a:solidFill>
+                            <a:prstClr val="black"/>
+                          </a:solidFill>
+                          <a:effectLst/>
+                          <a:uLnTx/>
+                          <a:uFillTx/>
+                          <a:latin typeface="Calibri" panose="020F0502020204030204"/>
+                          <a:ea typeface="+mn-ea"/>
+                          <a:cs typeface="+mn-cs"/>
+                        </a:rPr>
+                        <a:t>dlcc</a:t>
+                      </a:r>
+                      <a:r>
+                        <a:rPr kumimoji="0" lang="en-US" sz="1200" b="0" i="0" u="none" strike="noStrike" kern="1200" cap="none" spc="0" normalizeH="0" baseline="0" noProof="0" dirty="0">
+                          <a:ln>
+                            <a:noFill/>
+                          </a:ln>
+                          <a:solidFill>
+                            <a:prstClr val="black"/>
+                          </a:solidFill>
+                          <a:effectLst/>
+                          <a:uLnTx/>
+                          <a:uFillTx/>
+                          <a:latin typeface="Calibri" panose="020F0502020204030204"/>
+                          <a:ea typeface="+mn-ea"/>
+                          <a:cs typeface="+mn-cs"/>
+                        </a:rPr>
+                        <a:t>, dlcc789)_+dlcc789)_+</a:t>
+                      </a:r>
                     </a:p>
                   </a:txBody>
                   <a:tcPr anchor="ctr"/>
@@ -3820,8 +4081,40 @@
                     <a:bodyPr/>
                     <a:lstStyle/>
                     <a:p>
-                      <a:pPr algn="ctr"/>
-                      <a:endParaRPr lang="en-US" sz="1400" dirty="0"/>
+                      <a:pPr marL="0" marR="0" lvl="0" indent="0" algn="ctr" defTabSz="914400" rtl="0" eaLnBrk="1" fontAlgn="auto" latinLnBrk="0" hangingPunct="1">
+                        <a:lnSpc>
+                          <a:spcPct val="100000"/>
+                        </a:lnSpc>
+                        <a:spcBef>
+                          <a:spcPts val="0"/>
+                        </a:spcBef>
+                        <a:spcAft>
+                          <a:spcPts val="0"/>
+                        </a:spcAft>
+                        <a:buClrTx/>
+                        <a:buSzTx/>
+                        <a:buFontTx/>
+                        <a:buNone/>
+                        <a:tabLst/>
+                        <a:defRPr/>
+                      </a:pPr>
+                      <a:r>
+                        <a:rPr kumimoji="0" lang="en-US" sz="1200" b="0" i="0" u="none" strike="noStrike" kern="1200" cap="none" spc="0" normalizeH="0" baseline="0" noProof="0" dirty="0">
+                          <a:ln>
+                            <a:noFill/>
+                          </a:ln>
+                          <a:solidFill>
+                            <a:prstClr val="black"/>
+                          </a:solidFill>
+                          <a:effectLst/>
+                          <a:uLnTx/>
+                          <a:uFillTx/>
+                          <a:latin typeface="Calibri" panose="020F0502020204030204"/>
+                          <a:ea typeface="+mn-ea"/>
+                          <a:cs typeface="+mn-cs"/>
+                        </a:rPr>
+                        <a:t>9/14/2021</a:t>
+                      </a:r>
                     </a:p>
                   </a:txBody>
                   <a:tcPr anchor="ctr"/>
@@ -3857,7 +4150,34 @@
                     <a:lstStyle/>
                     <a:p>
                       <a:pPr algn="ctr"/>
-                      <a:endParaRPr lang="en-US" sz="1400" dirty="0"/>
+                      <a:r>
+                        <a:rPr lang="en-US" sz="1200" b="0" i="0" kern="1200" dirty="0">
+                          <a:solidFill>
+                            <a:schemeClr val="dk1"/>
+                          </a:solidFill>
+                          <a:effectLst/>
+                          <a:latin typeface="+mn-lt"/>
+                          <a:ea typeface="+mn-ea"/>
+                          <a:cs typeface="+mn-cs"/>
+                        </a:rPr>
+                        <a:t>troendle.eastus.cloudapp.azure.com</a:t>
+                      </a:r>
+                    </a:p>
+                    <a:p>
+                      <a:pPr algn="ctr"/>
+                      <a:r>
+                        <a:rPr lang="en-US" sz="1200" b="0" i="0" kern="1200" dirty="0">
+                          <a:solidFill>
+                            <a:schemeClr val="dk1"/>
+                          </a:solidFill>
+                          <a:effectLst/>
+                          <a:latin typeface="+mn-lt"/>
+                          <a:ea typeface="+mn-ea"/>
+                          <a:cs typeface="+mn-cs"/>
+                        </a:rPr>
+                        <a:t>40.87.86.252</a:t>
+                      </a:r>
+                      <a:endParaRPr lang="en-US" sz="1200" dirty="0"/>
                     </a:p>
                   </a:txBody>
                   <a:tcPr anchor="ctr"/>
@@ -3867,8 +4187,57 @@
                     <a:bodyPr/>
                     <a:lstStyle/>
                     <a:p>
-                      <a:pPr algn="ctr"/>
-                      <a:endParaRPr lang="en-US" sz="1400" dirty="0"/>
+                      <a:pPr marL="0" marR="0" lvl="0" indent="0" algn="ctr" defTabSz="914400" rtl="0" eaLnBrk="1" fontAlgn="auto" latinLnBrk="0" hangingPunct="1">
+                        <a:lnSpc>
+                          <a:spcPct val="100000"/>
+                        </a:lnSpc>
+                        <a:spcBef>
+                          <a:spcPts val="0"/>
+                        </a:spcBef>
+                        <a:spcAft>
+                          <a:spcPts val="0"/>
+                        </a:spcAft>
+                        <a:buClrTx/>
+                        <a:buSzTx/>
+                        <a:buFontTx/>
+                        <a:buNone/>
+                        <a:tabLst/>
+                        <a:defRPr/>
+                      </a:pPr>
+                      <a:r>
+                        <a:rPr kumimoji="0" lang="en-US" sz="1200" b="0" i="0" u="none" strike="noStrike" kern="1200" cap="none" spc="0" normalizeH="0" baseline="0" noProof="0" dirty="0" err="1">
+                          <a:ln>
+                            <a:noFill/>
+                          </a:ln>
+                          <a:solidFill>
+                            <a:prstClr val="black"/>
+                          </a:solidFill>
+                          <a:effectLst/>
+                          <a:uLnTx/>
+                          <a:uFillTx/>
+                          <a:latin typeface="Calibri" panose="020F0502020204030204"/>
+                          <a:ea typeface="+mn-ea"/>
+                          <a:cs typeface="+mn-cs"/>
+                        </a:rPr>
+                        <a:t>dlcc</a:t>
+                      </a:r>
+                      <a:r>
+                        <a:rPr kumimoji="0" lang="en-US" sz="1200" b="0" i="0" u="none" strike="noStrike" kern="1200" cap="none" spc="0" normalizeH="0" baseline="0" noProof="0" dirty="0">
+                          <a:ln>
+                            <a:noFill/>
+                          </a:ln>
+                          <a:solidFill>
+                            <a:prstClr val="black"/>
+                          </a:solidFill>
+                          <a:effectLst/>
+                          <a:uLnTx/>
+                          <a:uFillTx/>
+                          <a:latin typeface="Calibri" panose="020F0502020204030204"/>
+                          <a:ea typeface="+mn-ea"/>
+                          <a:cs typeface="+mn-cs"/>
+                        </a:rPr>
+                        <a:t>, dlcc789)_+dlcc789)_+</a:t>
+                      </a:r>
                     </a:p>
                   </a:txBody>
                   <a:tcPr anchor="ctr"/>
@@ -3878,8 +4247,40 @@
                     <a:bodyPr/>
                     <a:lstStyle/>
                     <a:p>
-                      <a:pPr algn="ctr"/>
-                      <a:endParaRPr lang="en-US" sz="1400" dirty="0"/>
+                      <a:pPr marL="0" marR="0" lvl="0" indent="0" algn="ctr" defTabSz="914400" rtl="0" eaLnBrk="1" fontAlgn="auto" latinLnBrk="0" hangingPunct="1">
+                        <a:lnSpc>
+                          <a:spcPct val="100000"/>
+                        </a:lnSpc>
+                        <a:spcBef>
+                          <a:spcPts val="0"/>
+                        </a:spcBef>
+                        <a:spcAft>
+                          <a:spcPts val="0"/>
+                        </a:spcAft>
+                        <a:buClrTx/>
+                        <a:buSzTx/>
+                        <a:buFontTx/>
+                        <a:buNone/>
+                        <a:tabLst/>
+                        <a:defRPr/>
+                      </a:pPr>
+                      <a:r>
+                        <a:rPr kumimoji="0" lang="en-US" sz="1200" b="0" i="0" u="none" strike="noStrike" kern="1200" cap="none" spc="0" normalizeH="0" baseline="0" noProof="0" dirty="0">
+                          <a:ln>
+                            <a:noFill/>
+                          </a:ln>
+                          <a:solidFill>
+                            <a:prstClr val="black"/>
+                          </a:solidFill>
+                          <a:effectLst/>
+                          <a:uLnTx/>
+                          <a:uFillTx/>
+                          <a:latin typeface="Calibri" panose="020F0502020204030204"/>
+                          <a:ea typeface="+mn-ea"/>
+                          <a:cs typeface="+mn-cs"/>
+                        </a:rPr>
+                        <a:t>9/14/2021</a:t>
+                      </a:r>
                     </a:p>
                   </a:txBody>
                   <a:tcPr anchor="ctr"/>
@@ -3919,7 +4320,34 @@
                     <a:lstStyle/>
                     <a:p>
                       <a:pPr algn="ctr"/>
-                      <a:endParaRPr lang="en-US" sz="1400" dirty="0"/>
+                      <a:r>
+                        <a:rPr lang="en-US" sz="1200" b="0" i="0" kern="1200" dirty="0">
+                          <a:solidFill>
+                            <a:schemeClr val="dk1"/>
+                          </a:solidFill>
+                          <a:effectLst/>
+                          <a:latin typeface="+mn-lt"/>
+                          <a:ea typeface="+mn-ea"/>
+                          <a:cs typeface="+mn-cs"/>
+                        </a:rPr>
+                        <a:t>wu001.eastus.cloudapp.azure.com</a:t>
+                      </a:r>
+                    </a:p>
+                    <a:p>
+                      <a:pPr algn="ctr"/>
+                      <a:r>
+                        <a:rPr lang="en-US" sz="1200" b="0" i="0" kern="1200" dirty="0">
+                          <a:solidFill>
+                            <a:schemeClr val="dk1"/>
+                          </a:solidFill>
+                          <a:effectLst/>
+                          <a:latin typeface="+mn-lt"/>
+                          <a:ea typeface="+mn-ea"/>
+                          <a:cs typeface="+mn-cs"/>
+                        </a:rPr>
+                        <a:t>20.102.70.154</a:t>
+                      </a:r>
+                      <a:endParaRPr lang="en-US" sz="1200" dirty="0"/>
                     </a:p>
                   </a:txBody>
                   <a:tcPr anchor="ctr"/>
@@ -3929,8 +4357,57 @@
                     <a:bodyPr/>
                     <a:lstStyle/>
                     <a:p>
-                      <a:pPr algn="ctr"/>
-                      <a:endParaRPr lang="en-US" sz="1400" dirty="0"/>
+                      <a:pPr marL="0" marR="0" lvl="0" indent="0" algn="ctr" defTabSz="914400" rtl="0" eaLnBrk="1" fontAlgn="auto" latinLnBrk="0" hangingPunct="1">
+                        <a:lnSpc>
+                          <a:spcPct val="100000"/>
+                        </a:lnSpc>
+                        <a:spcBef>
+                          <a:spcPts val="0"/>
+                        </a:spcBef>
+                        <a:spcAft>
+                          <a:spcPts val="0"/>
+                        </a:spcAft>
+                        <a:buClrTx/>
+                        <a:buSzTx/>
+                        <a:buFontTx/>
+                        <a:buNone/>
+                        <a:tabLst/>
+                        <a:defRPr/>
+                      </a:pPr>
+                      <a:r>
+                        <a:rPr kumimoji="0" lang="en-US" sz="1200" b="0" i="0" u="none" strike="noStrike" kern="1200" cap="none" spc="0" normalizeH="0" baseline="0" noProof="0" dirty="0" err="1">
+                          <a:ln>
+                            <a:noFill/>
+                          </a:ln>
+                          <a:solidFill>
+                            <a:prstClr val="black"/>
+                          </a:solidFill>
+                          <a:effectLst/>
+                          <a:uLnTx/>
+                          <a:uFillTx/>
+                          <a:latin typeface="Calibri" panose="020F0502020204030204"/>
+                          <a:ea typeface="+mn-ea"/>
+                          <a:cs typeface="+mn-cs"/>
+                        </a:rPr>
+                        <a:t>dlcc</a:t>
+                      </a:r>
+                      <a:r>
+                        <a:rPr kumimoji="0" lang="en-US" sz="1200" b="0" i="0" u="none" strike="noStrike" kern="1200" cap="none" spc="0" normalizeH="0" baseline="0" noProof="0" dirty="0">
+                          <a:ln>
+                            <a:noFill/>
+                          </a:ln>
+                          <a:solidFill>
+                            <a:prstClr val="black"/>
+                          </a:solidFill>
+                          <a:effectLst/>
+                          <a:uLnTx/>
+                          <a:uFillTx/>
+                          <a:latin typeface="Calibri" panose="020F0502020204030204"/>
+                          <a:ea typeface="+mn-ea"/>
+                          <a:cs typeface="+mn-cs"/>
+                        </a:rPr>
+                        <a:t>, dlcc789)_+dlcc789)_+</a:t>
+                      </a:r>
                     </a:p>
                   </a:txBody>
                   <a:tcPr anchor="ctr"/>
@@ -3940,8 +4417,40 @@
                     <a:bodyPr/>
                     <a:lstStyle/>
                     <a:p>
-                      <a:pPr algn="ctr"/>
-                      <a:endParaRPr lang="en-US" sz="1400" dirty="0"/>
+                      <a:pPr marL="0" marR="0" lvl="0" indent="0" algn="ctr" defTabSz="914400" rtl="0" eaLnBrk="1" fontAlgn="auto" latinLnBrk="0" hangingPunct="1">
+                        <a:lnSpc>
+                          <a:spcPct val="100000"/>
+                        </a:lnSpc>
+                        <a:spcBef>
+                          <a:spcPts val="0"/>
+                        </a:spcBef>
+                        <a:spcAft>
+                          <a:spcPts val="0"/>
+                        </a:spcAft>
+                        <a:buClrTx/>
+                        <a:buSzTx/>
+                        <a:buFontTx/>
+                        <a:buNone/>
+                        <a:tabLst/>
+                        <a:defRPr/>
+                      </a:pPr>
+                      <a:r>
+                        <a:rPr kumimoji="0" lang="en-US" sz="1200" b="0" i="0" u="none" strike="noStrike" kern="1200" cap="none" spc="0" normalizeH="0" baseline="0" noProof="0" dirty="0">
+                          <a:ln>
+                            <a:noFill/>
+                          </a:ln>
+                          <a:solidFill>
+                            <a:prstClr val="black"/>
+                          </a:solidFill>
+                          <a:effectLst/>
+                          <a:uLnTx/>
+                          <a:uFillTx/>
+                          <a:latin typeface="Calibri" panose="020F0502020204030204"/>
+                          <a:ea typeface="+mn-ea"/>
+                          <a:cs typeface="+mn-cs"/>
+                        </a:rPr>
+                        <a:t>9/14/2021</a:t>
+                      </a:r>
                     </a:p>
                   </a:txBody>
                   <a:tcPr anchor="ctr"/>
@@ -3981,7 +4490,34 @@
                     <a:lstStyle/>
                     <a:p>
                       <a:pPr algn="ctr"/>
-                      <a:endParaRPr lang="en-US" sz="1400" dirty="0"/>
+                      <a:r>
+                        <a:rPr lang="en-US" sz="1200" b="0" i="0" kern="1200" dirty="0">
+                          <a:solidFill>
+                            <a:schemeClr val="dk1"/>
+                          </a:solidFill>
+                          <a:effectLst/>
+                          <a:latin typeface="+mn-lt"/>
+                          <a:ea typeface="+mn-ea"/>
+                          <a:cs typeface="+mn-cs"/>
+                        </a:rPr>
+                        <a:t>li001.eastus.cloudapp.azure.com</a:t>
+                      </a:r>
+                    </a:p>
+                    <a:p>
+                      <a:pPr algn="ctr"/>
+                      <a:r>
+                        <a:rPr lang="en-US" sz="1200" b="0" i="0" kern="1200" dirty="0">
+                          <a:solidFill>
+                            <a:schemeClr val="dk1"/>
+                          </a:solidFill>
+                          <a:effectLst/>
+                          <a:latin typeface="+mn-lt"/>
+                          <a:ea typeface="+mn-ea"/>
+                          <a:cs typeface="+mn-cs"/>
+                        </a:rPr>
+                        <a:t>13.90.206.38</a:t>
+                      </a:r>
+                      <a:endParaRPr lang="en-US" sz="1200" dirty="0"/>
                     </a:p>
                   </a:txBody>
                   <a:tcPr anchor="ctr"/>
@@ -3991,8 +4527,57 @@
                     <a:bodyPr/>
                     <a:lstStyle/>
                     <a:p>
-                      <a:pPr algn="ctr"/>
-                      <a:endParaRPr lang="en-US" sz="1400" dirty="0"/>
+                      <a:pPr marL="0" marR="0" lvl="0" indent="0" algn="ctr" defTabSz="914400" rtl="0" eaLnBrk="1" fontAlgn="auto" latinLnBrk="0" hangingPunct="1">
+                        <a:lnSpc>
+                          <a:spcPct val="100000"/>
+                        </a:lnSpc>
+                        <a:spcBef>
+                          <a:spcPts val="0"/>
+                        </a:spcBef>
+                        <a:spcAft>
+                          <a:spcPts val="0"/>
+                        </a:spcAft>
+                        <a:buClrTx/>
+                        <a:buSzTx/>
+                        <a:buFontTx/>
+                        <a:buNone/>
+                        <a:tabLst/>
+                        <a:defRPr/>
+                      </a:pPr>
+                      <a:r>
+                        <a:rPr kumimoji="0" lang="en-US" sz="1200" b="0" i="0" u="none" strike="noStrike" kern="1200" cap="none" spc="0" normalizeH="0" baseline="0" noProof="0" dirty="0" err="1">
+                          <a:ln>
+                            <a:noFill/>
+                          </a:ln>
+                          <a:solidFill>
+                            <a:prstClr val="black"/>
+                          </a:solidFill>
+                          <a:effectLst/>
+                          <a:uLnTx/>
+                          <a:uFillTx/>
+                          <a:latin typeface="Calibri" panose="020F0502020204030204"/>
+                          <a:ea typeface="+mn-ea"/>
+                          <a:cs typeface="+mn-cs"/>
+                        </a:rPr>
+                        <a:t>dlcc</a:t>
+                      </a:r>
+                      <a:r>
+                        <a:rPr kumimoji="0" lang="en-US" sz="1200" b="0" i="0" u="none" strike="noStrike" kern="1200" cap="none" spc="0" normalizeH="0" baseline="0" noProof="0" dirty="0">
+                          <a:ln>
+                            <a:noFill/>
+                          </a:ln>
+                          <a:solidFill>
+                            <a:prstClr val="black"/>
+                          </a:solidFill>
+                          <a:effectLst/>
+                          <a:uLnTx/>
+                          <a:uFillTx/>
+                          <a:latin typeface="Calibri" panose="020F0502020204030204"/>
+                          <a:ea typeface="+mn-ea"/>
+                          <a:cs typeface="+mn-cs"/>
+                        </a:rPr>
+                        <a:t>, dlcc789)_+dlcc789)_+</a:t>
+                      </a:r>
                     </a:p>
                   </a:txBody>
                   <a:tcPr anchor="ctr"/>
@@ -4002,8 +4587,40 @@
                     <a:bodyPr/>
                     <a:lstStyle/>
                     <a:p>
-                      <a:pPr algn="ctr"/>
-                      <a:endParaRPr lang="en-US" sz="1400" dirty="0"/>
+                      <a:pPr marL="0" marR="0" lvl="0" indent="0" algn="ctr" defTabSz="914400" rtl="0" eaLnBrk="1" fontAlgn="auto" latinLnBrk="0" hangingPunct="1">
+                        <a:lnSpc>
+                          <a:spcPct val="100000"/>
+                        </a:lnSpc>
+                        <a:spcBef>
+                          <a:spcPts val="0"/>
+                        </a:spcBef>
+                        <a:spcAft>
+                          <a:spcPts val="0"/>
+                        </a:spcAft>
+                        <a:buClrTx/>
+                        <a:buSzTx/>
+                        <a:buFontTx/>
+                        <a:buNone/>
+                        <a:tabLst/>
+                        <a:defRPr/>
+                      </a:pPr>
+                      <a:r>
+                        <a:rPr kumimoji="0" lang="en-US" sz="1200" b="0" i="0" u="none" strike="noStrike" kern="1200" cap="none" spc="0" normalizeH="0" baseline="0" noProof="0" dirty="0">
+                          <a:ln>
+                            <a:noFill/>
+                          </a:ln>
+                          <a:solidFill>
+                            <a:prstClr val="black"/>
+                          </a:solidFill>
+                          <a:effectLst/>
+                          <a:uLnTx/>
+                          <a:uFillTx/>
+                          <a:latin typeface="Calibri" panose="020F0502020204030204"/>
+                          <a:ea typeface="+mn-ea"/>
+                          <a:cs typeface="+mn-cs"/>
+                        </a:rPr>
+                        <a:t>9/14/2021</a:t>
+                      </a:r>
                     </a:p>
                   </a:txBody>
                   <a:tcPr anchor="ctr"/>
@@ -4036,7 +4653,34 @@
                     <a:lstStyle/>
                     <a:p>
                       <a:pPr algn="ctr"/>
-                      <a:endParaRPr lang="en-US" sz="1400" dirty="0"/>
+                      <a:r>
+                        <a:rPr lang="en-US" sz="1200" b="0" i="0" kern="1200" dirty="0">
+                          <a:solidFill>
+                            <a:schemeClr val="dk1"/>
+                          </a:solidFill>
+                          <a:effectLst/>
+                          <a:latin typeface="+mn-lt"/>
+                          <a:ea typeface="+mn-ea"/>
+                          <a:cs typeface="+mn-cs"/>
+                        </a:rPr>
+                        <a:t>leifer.eastus.cloudapp.azure.com</a:t>
+                      </a:r>
+                    </a:p>
+                    <a:p>
+                      <a:pPr algn="ctr"/>
+                      <a:r>
+                        <a:rPr lang="en-US" sz="1200" b="0" i="0" kern="1200" dirty="0">
+                          <a:solidFill>
+                            <a:schemeClr val="dk1"/>
+                          </a:solidFill>
+                          <a:effectLst/>
+                          <a:latin typeface="+mn-lt"/>
+                          <a:ea typeface="+mn-ea"/>
+                          <a:cs typeface="+mn-cs"/>
+                        </a:rPr>
+                        <a:t>13.82.66.26</a:t>
+                      </a:r>
+                      <a:endParaRPr lang="en-US" sz="1200" dirty="0"/>
                     </a:p>
                   </a:txBody>
                   <a:tcPr anchor="ctr"/>
@@ -4046,8 +4690,57 @@
                     <a:bodyPr/>
                     <a:lstStyle/>
                     <a:p>
-                      <a:pPr algn="ctr"/>
-                      <a:endParaRPr lang="en-US" sz="1400" dirty="0"/>
+                      <a:pPr marL="0" marR="0" lvl="0" indent="0" algn="ctr" defTabSz="914400" rtl="0" eaLnBrk="1" fontAlgn="auto" latinLnBrk="0" hangingPunct="1">
+                        <a:lnSpc>
+                          <a:spcPct val="100000"/>
+                        </a:lnSpc>
+                        <a:spcBef>
+                          <a:spcPts val="0"/>
+                        </a:spcBef>
+                        <a:spcAft>
+                          <a:spcPts val="0"/>
+                        </a:spcAft>
+                        <a:buClrTx/>
+                        <a:buSzTx/>
+                        <a:buFontTx/>
+                        <a:buNone/>
+                        <a:tabLst/>
+                        <a:defRPr/>
+                      </a:pPr>
+                      <a:r>
+                        <a:rPr kumimoji="0" lang="en-US" sz="1200" b="0" i="0" u="none" strike="noStrike" kern="1200" cap="none" spc="0" normalizeH="0" baseline="0" noProof="0" dirty="0" err="1">
+                          <a:ln>
+                            <a:noFill/>
+                          </a:ln>
+                          <a:solidFill>
+                            <a:prstClr val="black"/>
+                          </a:solidFill>
+                          <a:effectLst/>
+                          <a:uLnTx/>
+                          <a:uFillTx/>
+                          <a:latin typeface="Calibri" panose="020F0502020204030204"/>
+                          <a:ea typeface="+mn-ea"/>
+                          <a:cs typeface="+mn-cs"/>
+                        </a:rPr>
+                        <a:t>dlcc</a:t>
+                      </a:r>
+                      <a:r>
+                        <a:rPr kumimoji="0" lang="en-US" sz="1200" b="0" i="0" u="none" strike="noStrike" kern="1200" cap="none" spc="0" normalizeH="0" baseline="0" noProof="0" dirty="0">
+                          <a:ln>
+                            <a:noFill/>
+                          </a:ln>
+                          <a:solidFill>
+                            <a:prstClr val="black"/>
+                          </a:solidFill>
+                          <a:effectLst/>
+                          <a:uLnTx/>
+                          <a:uFillTx/>
+                          <a:latin typeface="Calibri" panose="020F0502020204030204"/>
+                          <a:ea typeface="+mn-ea"/>
+                          <a:cs typeface="+mn-cs"/>
+                        </a:rPr>
+                        <a:t>, dlcc789)_+dlcc789)_+</a:t>
+                      </a:r>
                     </a:p>
                   </a:txBody>
                   <a:tcPr anchor="ctr"/>
@@ -4057,8 +4750,40 @@
                     <a:bodyPr/>
                     <a:lstStyle/>
                     <a:p>
-                      <a:pPr algn="ctr"/>
-                      <a:endParaRPr lang="en-US" sz="1400" dirty="0"/>
+                      <a:pPr marL="0" marR="0" lvl="0" indent="0" algn="ctr" defTabSz="914400" rtl="0" eaLnBrk="1" fontAlgn="auto" latinLnBrk="0" hangingPunct="1">
+                        <a:lnSpc>
+                          <a:spcPct val="100000"/>
+                        </a:lnSpc>
+                        <a:spcBef>
+                          <a:spcPts val="0"/>
+                        </a:spcBef>
+                        <a:spcAft>
+                          <a:spcPts val="0"/>
+                        </a:spcAft>
+                        <a:buClrTx/>
+                        <a:buSzTx/>
+                        <a:buFontTx/>
+                        <a:buNone/>
+                        <a:tabLst/>
+                        <a:defRPr/>
+                      </a:pPr>
+                      <a:r>
+                        <a:rPr kumimoji="0" lang="en-US" sz="1200" b="0" i="0" u="none" strike="noStrike" kern="1200" cap="none" spc="0" normalizeH="0" baseline="0" noProof="0" dirty="0">
+                          <a:ln>
+                            <a:noFill/>
+                          </a:ln>
+                          <a:solidFill>
+                            <a:prstClr val="black"/>
+                          </a:solidFill>
+                          <a:effectLst/>
+                          <a:uLnTx/>
+                          <a:uFillTx/>
+                          <a:latin typeface="Calibri" panose="020F0502020204030204"/>
+                          <a:ea typeface="+mn-ea"/>
+                          <a:cs typeface="+mn-cs"/>
+                        </a:rPr>
+                        <a:t>9/14/2021</a:t>
+                      </a:r>
                     </a:p>
                   </a:txBody>
                   <a:tcPr anchor="ctr"/>
@@ -4091,7 +4816,34 @@
                     <a:lstStyle/>
                     <a:p>
                       <a:pPr algn="ctr"/>
-                      <a:endParaRPr lang="en-US" sz="1400" dirty="0"/>
+                      <a:r>
+                        <a:rPr lang="en-US" sz="1200" b="0" i="0" kern="1200" dirty="0">
+                          <a:solidFill>
+                            <a:schemeClr val="dk1"/>
+                          </a:solidFill>
+                          <a:effectLst/>
+                          <a:latin typeface="+mn-lt"/>
+                          <a:ea typeface="+mn-ea"/>
+                          <a:cs typeface="+mn-cs"/>
+                        </a:rPr>
+                        <a:t>yang.eastus.cloudapp.azure.com</a:t>
+                      </a:r>
+                    </a:p>
+                    <a:p>
+                      <a:pPr algn="ctr"/>
+                      <a:r>
+                        <a:rPr lang="en-US" sz="1200" b="0" i="0" kern="1200" dirty="0">
+                          <a:solidFill>
+                            <a:schemeClr val="dk1"/>
+                          </a:solidFill>
+                          <a:effectLst/>
+                          <a:latin typeface="+mn-lt"/>
+                          <a:ea typeface="+mn-ea"/>
+                          <a:cs typeface="+mn-cs"/>
+                        </a:rPr>
+                        <a:t>40.76.15.10</a:t>
+                      </a:r>
+                      <a:endParaRPr lang="en-US" sz="1200" dirty="0"/>
                     </a:p>
                   </a:txBody>
                   <a:tcPr anchor="ctr"/>
@@ -4101,8 +4853,57 @@
                     <a:bodyPr/>
                     <a:lstStyle/>
                     <a:p>
-                      <a:pPr algn="ctr"/>
-                      <a:endParaRPr lang="en-US" sz="1400" dirty="0"/>
+                      <a:pPr marL="0" marR="0" lvl="0" indent="0" algn="ctr" defTabSz="914400" rtl="0" eaLnBrk="1" fontAlgn="auto" latinLnBrk="0" hangingPunct="1">
+                        <a:lnSpc>
+                          <a:spcPct val="100000"/>
+                        </a:lnSpc>
+                        <a:spcBef>
+                          <a:spcPts val="0"/>
+                        </a:spcBef>
+                        <a:spcAft>
+                          <a:spcPts val="0"/>
+                        </a:spcAft>
+                        <a:buClrTx/>
+                        <a:buSzTx/>
+                        <a:buFontTx/>
+                        <a:buNone/>
+                        <a:tabLst/>
+                        <a:defRPr/>
+                      </a:pPr>
+                      <a:r>
+                        <a:rPr kumimoji="0" lang="en-US" sz="1200" b="0" i="0" u="none" strike="noStrike" kern="1200" cap="none" spc="0" normalizeH="0" baseline="0" noProof="0" dirty="0" err="1">
+                          <a:ln>
+                            <a:noFill/>
+                          </a:ln>
+                          <a:solidFill>
+                            <a:prstClr val="black"/>
+                          </a:solidFill>
+                          <a:effectLst/>
+                          <a:uLnTx/>
+                          <a:uFillTx/>
+                          <a:latin typeface="Calibri" panose="020F0502020204030204"/>
+                          <a:ea typeface="+mn-ea"/>
+                          <a:cs typeface="+mn-cs"/>
+                        </a:rPr>
+                        <a:t>dlcc</a:t>
+                      </a:r>
+                      <a:r>
+                        <a:rPr kumimoji="0" lang="en-US" sz="1200" b="0" i="0" u="none" strike="noStrike" kern="1200" cap="none" spc="0" normalizeH="0" baseline="0" noProof="0" dirty="0">
+                          <a:ln>
+                            <a:noFill/>
+                          </a:ln>
+                          <a:solidFill>
+                            <a:prstClr val="black"/>
+                          </a:solidFill>
+                          <a:effectLst/>
+                          <a:uLnTx/>
+                          <a:uFillTx/>
+                          <a:latin typeface="Calibri" panose="020F0502020204030204"/>
+                          <a:ea typeface="+mn-ea"/>
+                          <a:cs typeface="+mn-cs"/>
+                        </a:rPr>
+                        <a:t>, dlcc789)_+dlcc789)_+</a:t>
+                      </a:r>
                     </a:p>
                   </a:txBody>
                   <a:tcPr anchor="ctr"/>
@@ -4112,8 +4913,40 @@
                     <a:bodyPr/>
                     <a:lstStyle/>
                     <a:p>
-                      <a:pPr algn="ctr"/>
-                      <a:endParaRPr lang="en-US" sz="1400" dirty="0"/>
+                      <a:pPr marL="0" marR="0" lvl="0" indent="0" algn="ctr" defTabSz="914400" rtl="0" eaLnBrk="1" fontAlgn="auto" latinLnBrk="0" hangingPunct="1">
+                        <a:lnSpc>
+                          <a:spcPct val="100000"/>
+                        </a:lnSpc>
+                        <a:spcBef>
+                          <a:spcPts val="0"/>
+                        </a:spcBef>
+                        <a:spcAft>
+                          <a:spcPts val="0"/>
+                        </a:spcAft>
+                        <a:buClrTx/>
+                        <a:buSzTx/>
+                        <a:buFontTx/>
+                        <a:buNone/>
+                        <a:tabLst/>
+                        <a:defRPr/>
+                      </a:pPr>
+                      <a:r>
+                        <a:rPr kumimoji="0" lang="en-US" sz="1200" b="0" i="0" u="none" strike="noStrike" kern="1200" cap="none" spc="0" normalizeH="0" baseline="0" noProof="0" dirty="0">
+                          <a:ln>
+                            <a:noFill/>
+                          </a:ln>
+                          <a:solidFill>
+                            <a:prstClr val="black"/>
+                          </a:solidFill>
+                          <a:effectLst/>
+                          <a:uLnTx/>
+                          <a:uFillTx/>
+                          <a:latin typeface="Calibri" panose="020F0502020204030204"/>
+                          <a:ea typeface="+mn-ea"/>
+                          <a:cs typeface="+mn-cs"/>
+                        </a:rPr>
+                        <a:t>9/14/2021</a:t>
+                      </a:r>
                     </a:p>
                   </a:txBody>
                   <a:tcPr anchor="ctr"/>
@@ -4124,7 +4957,7 @@
                   </a:ext>
                 </a:extLst>
               </a:tr>
-              <a:tr h="336165">
+              <a:tr h="486803">
                 <a:tc>
                   <a:txBody>
                     <a:bodyPr/>
@@ -4146,7 +4979,34 @@
                     <a:lstStyle/>
                     <a:p>
                       <a:pPr algn="ctr"/>
-                      <a:endParaRPr lang="en-US" sz="1400" dirty="0"/>
+                      <a:r>
+                        <a:rPr lang="en-US" sz="1200" b="0" i="0" kern="1200" dirty="0">
+                          <a:solidFill>
+                            <a:schemeClr val="dk1"/>
+                          </a:solidFill>
+                          <a:effectLst/>
+                          <a:latin typeface="+mn-lt"/>
+                          <a:ea typeface="+mn-ea"/>
+                          <a:cs typeface="+mn-cs"/>
+                        </a:rPr>
+                        <a:t>lucotte.eastus.cloudapp.azure.com</a:t>
+                      </a:r>
+                    </a:p>
+                    <a:p>
+                      <a:pPr algn="ctr"/>
+                      <a:r>
+                        <a:rPr lang="en-US" sz="1200" b="0" i="0" kern="1200" dirty="0">
+                          <a:solidFill>
+                            <a:schemeClr val="dk1"/>
+                          </a:solidFill>
+                          <a:effectLst/>
+                          <a:latin typeface="+mn-lt"/>
+                          <a:ea typeface="+mn-ea"/>
+                          <a:cs typeface="+mn-cs"/>
+                        </a:rPr>
+                        <a:t>40.76.6.50</a:t>
+                      </a:r>
+                      <a:endParaRPr lang="en-US" sz="1200" dirty="0"/>
                     </a:p>
                   </a:txBody>
                   <a:tcPr anchor="ctr"/>
@@ -4156,8 +5016,57 @@
                     <a:bodyPr/>
                     <a:lstStyle/>
                     <a:p>
-                      <a:pPr algn="ctr"/>
-                      <a:endParaRPr lang="en-US" sz="1400" dirty="0"/>
+                      <a:pPr marL="0" marR="0" lvl="0" indent="0" algn="ctr" defTabSz="914400" rtl="0" eaLnBrk="1" fontAlgn="auto" latinLnBrk="0" hangingPunct="1">
+                        <a:lnSpc>
+                          <a:spcPct val="100000"/>
+                        </a:lnSpc>
+                        <a:spcBef>
+                          <a:spcPts val="0"/>
+                        </a:spcBef>
+                        <a:spcAft>
+                          <a:spcPts val="0"/>
+                        </a:spcAft>
+                        <a:buClrTx/>
+                        <a:buSzTx/>
+                        <a:buFontTx/>
+                        <a:buNone/>
+                        <a:tabLst/>
+                        <a:defRPr/>
+                      </a:pPr>
+                      <a:r>
+                        <a:rPr kumimoji="0" lang="en-US" sz="1200" b="0" i="0" u="none" strike="noStrike" kern="1200" cap="none" spc="0" normalizeH="0" baseline="0" noProof="0" dirty="0" err="1">
+                          <a:ln>
+                            <a:noFill/>
+                          </a:ln>
+                          <a:solidFill>
+                            <a:prstClr val="black"/>
+                          </a:solidFill>
+                          <a:effectLst/>
+                          <a:uLnTx/>
+                          <a:uFillTx/>
+                          <a:latin typeface="Calibri" panose="020F0502020204030204"/>
+                          <a:ea typeface="+mn-ea"/>
+                          <a:cs typeface="+mn-cs"/>
+                        </a:rPr>
+                        <a:t>dlcc</a:t>
+                      </a:r>
+                      <a:r>
+                        <a:rPr kumimoji="0" lang="en-US" sz="1200" b="0" i="0" u="none" strike="noStrike" kern="1200" cap="none" spc="0" normalizeH="0" baseline="0" noProof="0" dirty="0">
+                          <a:ln>
+                            <a:noFill/>
+                          </a:ln>
+                          <a:solidFill>
+                            <a:prstClr val="black"/>
+                          </a:solidFill>
+                          <a:effectLst/>
+                          <a:uLnTx/>
+                          <a:uFillTx/>
+                          <a:latin typeface="Calibri" panose="020F0502020204030204"/>
+                          <a:ea typeface="+mn-ea"/>
+                          <a:cs typeface="+mn-cs"/>
+                        </a:rPr>
+                        <a:t>, dlcc789)_+dlcc789)_+</a:t>
+                      </a:r>
                     </a:p>
                   </a:txBody>
                   <a:tcPr anchor="ctr"/>
@@ -4167,8 +5076,40 @@
                     <a:bodyPr/>
                     <a:lstStyle/>
                     <a:p>
-                      <a:pPr algn="ctr"/>
-                      <a:endParaRPr lang="en-US" sz="1400" dirty="0"/>
+                      <a:pPr marL="0" marR="0" lvl="0" indent="0" algn="ctr" defTabSz="914400" rtl="0" eaLnBrk="1" fontAlgn="auto" latinLnBrk="0" hangingPunct="1">
+                        <a:lnSpc>
+                          <a:spcPct val="100000"/>
+                        </a:lnSpc>
+                        <a:spcBef>
+                          <a:spcPts val="0"/>
+                        </a:spcBef>
+                        <a:spcAft>
+                          <a:spcPts val="0"/>
+                        </a:spcAft>
+                        <a:buClrTx/>
+                        <a:buSzTx/>
+                        <a:buFontTx/>
+                        <a:buNone/>
+                        <a:tabLst/>
+                        <a:defRPr/>
+                      </a:pPr>
+                      <a:r>
+                        <a:rPr kumimoji="0" lang="en-US" sz="1200" b="0" i="0" u="none" strike="noStrike" kern="1200" cap="none" spc="0" normalizeH="0" baseline="0" noProof="0" dirty="0">
+                          <a:ln>
+                            <a:noFill/>
+                          </a:ln>
+                          <a:solidFill>
+                            <a:prstClr val="black"/>
+                          </a:solidFill>
+                          <a:effectLst/>
+                          <a:uLnTx/>
+                          <a:uFillTx/>
+                          <a:latin typeface="Calibri" panose="020F0502020204030204"/>
+                          <a:ea typeface="+mn-ea"/>
+                          <a:cs typeface="+mn-cs"/>
+                        </a:rPr>
+                        <a:t>9/14/2021</a:t>
+                      </a:r>
                     </a:p>
                   </a:txBody>
                   <a:tcPr anchor="ctr"/>
@@ -4200,7 +5141,34 @@
                     <a:lstStyle/>
                     <a:p>
                       <a:pPr algn="ctr"/>
-                      <a:endParaRPr lang="en-US" sz="1400" dirty="0"/>
+                      <a:r>
+                        <a:rPr lang="en-US" sz="1200" b="0" i="0" kern="1200" dirty="0">
+                          <a:solidFill>
+                            <a:schemeClr val="dk1"/>
+                          </a:solidFill>
+                          <a:effectLst/>
+                          <a:latin typeface="+mn-lt"/>
+                          <a:ea typeface="+mn-ea"/>
+                          <a:cs typeface="+mn-cs"/>
+                        </a:rPr>
+                        <a:t>kim001.eastus.cloudapp.azure.com</a:t>
+                      </a:r>
+                    </a:p>
+                    <a:p>
+                      <a:pPr algn="ctr"/>
+                      <a:r>
+                        <a:rPr lang="en-US" sz="1200" b="0" i="0" kern="1200" dirty="0">
+                          <a:solidFill>
+                            <a:schemeClr val="dk1"/>
+                          </a:solidFill>
+                          <a:effectLst/>
+                          <a:latin typeface="+mn-lt"/>
+                          <a:ea typeface="+mn-ea"/>
+                          <a:cs typeface="+mn-cs"/>
+                        </a:rPr>
+                        <a:t>13.72.108.103</a:t>
+                      </a:r>
+                      <a:endParaRPr lang="en-US" sz="1200" dirty="0"/>
                     </a:p>
                   </a:txBody>
                   <a:tcPr anchor="ctr"/>
@@ -4210,8 +5178,57 @@
                     <a:bodyPr/>
                     <a:lstStyle/>
                     <a:p>
-                      <a:pPr algn="ctr"/>
-                      <a:endParaRPr lang="en-US" sz="1400" dirty="0"/>
+                      <a:pPr marL="0" marR="0" lvl="0" indent="0" algn="ctr" defTabSz="914400" rtl="0" eaLnBrk="1" fontAlgn="auto" latinLnBrk="0" hangingPunct="1">
+                        <a:lnSpc>
+                          <a:spcPct val="100000"/>
+                        </a:lnSpc>
+                        <a:spcBef>
+                          <a:spcPts val="0"/>
+                        </a:spcBef>
+                        <a:spcAft>
+                          <a:spcPts val="0"/>
+                        </a:spcAft>
+                        <a:buClrTx/>
+                        <a:buSzTx/>
+                        <a:buFontTx/>
+                        <a:buNone/>
+                        <a:tabLst/>
+                        <a:defRPr/>
+                      </a:pPr>
+                      <a:r>
+                        <a:rPr kumimoji="0" lang="en-US" sz="1200" b="0" i="0" u="none" strike="noStrike" kern="1200" cap="none" spc="0" normalizeH="0" baseline="0" noProof="0" dirty="0" err="1">
+                          <a:ln>
+                            <a:noFill/>
+                          </a:ln>
+                          <a:solidFill>
+                            <a:prstClr val="black"/>
+                          </a:solidFill>
+                          <a:effectLst/>
+                          <a:uLnTx/>
+                          <a:uFillTx/>
+                          <a:latin typeface="Calibri" panose="020F0502020204030204"/>
+                          <a:ea typeface="+mn-ea"/>
+                          <a:cs typeface="+mn-cs"/>
+                        </a:rPr>
+                        <a:t>dlcc</a:t>
+                      </a:r>
+                      <a:r>
+                        <a:rPr kumimoji="0" lang="en-US" sz="1200" b="0" i="0" u="none" strike="noStrike" kern="1200" cap="none" spc="0" normalizeH="0" baseline="0" noProof="0" dirty="0">
+                          <a:ln>
+                            <a:noFill/>
+                          </a:ln>
+                          <a:solidFill>
+                            <a:prstClr val="black"/>
+                          </a:solidFill>
+                          <a:effectLst/>
+                          <a:uLnTx/>
+                          <a:uFillTx/>
+                          <a:latin typeface="Calibri" panose="020F0502020204030204"/>
+                          <a:ea typeface="+mn-ea"/>
+                          <a:cs typeface="+mn-cs"/>
+                        </a:rPr>
+                        <a:t>, dlcc789)_+dlcc789)_+</a:t>
+                      </a:r>
                     </a:p>
                   </a:txBody>
                   <a:tcPr anchor="ctr"/>
@@ -4221,8 +5238,40 @@
                     <a:bodyPr/>
                     <a:lstStyle/>
                     <a:p>
-                      <a:pPr algn="ctr"/>
-                      <a:endParaRPr lang="en-US" sz="1400" dirty="0"/>
+                      <a:pPr marL="0" marR="0" lvl="0" indent="0" algn="ctr" defTabSz="914400" rtl="0" eaLnBrk="1" fontAlgn="auto" latinLnBrk="0" hangingPunct="1">
+                        <a:lnSpc>
+                          <a:spcPct val="100000"/>
+                        </a:lnSpc>
+                        <a:spcBef>
+                          <a:spcPts val="0"/>
+                        </a:spcBef>
+                        <a:spcAft>
+                          <a:spcPts val="0"/>
+                        </a:spcAft>
+                        <a:buClrTx/>
+                        <a:buSzTx/>
+                        <a:buFontTx/>
+                        <a:buNone/>
+                        <a:tabLst/>
+                        <a:defRPr/>
+                      </a:pPr>
+                      <a:r>
+                        <a:rPr kumimoji="0" lang="en-US" sz="1200" b="0" i="0" u="none" strike="noStrike" kern="1200" cap="none" spc="0" normalizeH="0" baseline="0" noProof="0" dirty="0">
+                          <a:ln>
+                            <a:noFill/>
+                          </a:ln>
+                          <a:solidFill>
+                            <a:prstClr val="black"/>
+                          </a:solidFill>
+                          <a:effectLst/>
+                          <a:uLnTx/>
+                          <a:uFillTx/>
+                          <a:latin typeface="Calibri" panose="020F0502020204030204"/>
+                          <a:ea typeface="+mn-ea"/>
+                          <a:cs typeface="+mn-cs"/>
+                        </a:rPr>
+                        <a:t>9/14/2021</a:t>
+                      </a:r>
                     </a:p>
                   </a:txBody>
                   <a:tcPr anchor="ctr"/>
@@ -4262,7 +5311,34 @@
                     <a:lstStyle/>
                     <a:p>
                       <a:pPr algn="ctr"/>
-                      <a:endParaRPr lang="en-US" sz="1400" dirty="0"/>
+                      <a:r>
+                        <a:rPr lang="en-US" sz="1200" b="0" i="0" kern="1200" dirty="0">
+                          <a:solidFill>
+                            <a:schemeClr val="dk1"/>
+                          </a:solidFill>
+                          <a:effectLst/>
+                          <a:latin typeface="+mn-lt"/>
+                          <a:ea typeface="+mn-ea"/>
+                          <a:cs typeface="+mn-cs"/>
+                        </a:rPr>
+                        <a:t>basnet.eastus.cloudapp.azure.com</a:t>
+                      </a:r>
+                    </a:p>
+                    <a:p>
+                      <a:pPr algn="ctr"/>
+                      <a:r>
+                        <a:rPr lang="en-US" sz="1200" b="0" i="0" kern="1200" dirty="0">
+                          <a:solidFill>
+                            <a:schemeClr val="dk1"/>
+                          </a:solidFill>
+                          <a:effectLst/>
+                          <a:latin typeface="+mn-lt"/>
+                          <a:ea typeface="+mn-ea"/>
+                          <a:cs typeface="+mn-cs"/>
+                        </a:rPr>
+                        <a:t>13.68.176.68</a:t>
+                      </a:r>
+                      <a:endParaRPr lang="en-US" sz="1200" dirty="0"/>
                     </a:p>
                   </a:txBody>
                   <a:tcPr anchor="ctr"/>
@@ -4272,8 +5348,57 @@
                     <a:bodyPr/>
                     <a:lstStyle/>
                     <a:p>
-                      <a:pPr algn="ctr"/>
-                      <a:endParaRPr lang="en-US" sz="1400" dirty="0"/>
+                      <a:pPr marL="0" marR="0" lvl="0" indent="0" algn="ctr" defTabSz="914400" rtl="0" eaLnBrk="1" fontAlgn="auto" latinLnBrk="0" hangingPunct="1">
+                        <a:lnSpc>
+                          <a:spcPct val="100000"/>
+                        </a:lnSpc>
+                        <a:spcBef>
+                          <a:spcPts val="0"/>
+                        </a:spcBef>
+                        <a:spcAft>
+                          <a:spcPts val="0"/>
+                        </a:spcAft>
+                        <a:buClrTx/>
+                        <a:buSzTx/>
+                        <a:buFontTx/>
+                        <a:buNone/>
+                        <a:tabLst/>
+                        <a:defRPr/>
+                      </a:pPr>
+                      <a:r>
+                        <a:rPr kumimoji="0" lang="en-US" sz="1200" b="0" i="0" u="none" strike="noStrike" kern="1200" cap="none" spc="0" normalizeH="0" baseline="0" noProof="0" dirty="0" err="1">
+                          <a:ln>
+                            <a:noFill/>
+                          </a:ln>
+                          <a:solidFill>
+                            <a:prstClr val="black"/>
+                          </a:solidFill>
+                          <a:effectLst/>
+                          <a:uLnTx/>
+                          <a:uFillTx/>
+                          <a:latin typeface="Calibri" panose="020F0502020204030204"/>
+                          <a:ea typeface="+mn-ea"/>
+                          <a:cs typeface="+mn-cs"/>
+                        </a:rPr>
+                        <a:t>dlcc</a:t>
+                      </a:r>
+                      <a:r>
+                        <a:rPr kumimoji="0" lang="en-US" sz="1200" b="0" i="0" u="none" strike="noStrike" kern="1200" cap="none" spc="0" normalizeH="0" baseline="0" noProof="0" dirty="0">
+                          <a:ln>
+                            <a:noFill/>
+                          </a:ln>
+                          <a:solidFill>
+                            <a:prstClr val="black"/>
+                          </a:solidFill>
+                          <a:effectLst/>
+                          <a:uLnTx/>
+                          <a:uFillTx/>
+                          <a:latin typeface="Calibri" panose="020F0502020204030204"/>
+                          <a:ea typeface="+mn-ea"/>
+                          <a:cs typeface="+mn-cs"/>
+                        </a:rPr>
+                        <a:t>, dlcc789)_+dlcc789)_+</a:t>
+                      </a:r>
                     </a:p>
                   </a:txBody>
                   <a:tcPr anchor="ctr"/>
@@ -4283,8 +5408,40 @@
                     <a:bodyPr/>
                     <a:lstStyle/>
                     <a:p>
-                      <a:pPr algn="ctr"/>
-                      <a:endParaRPr lang="en-US" sz="1400" dirty="0"/>
+                      <a:pPr marL="0" marR="0" lvl="0" indent="0" algn="ctr" defTabSz="914400" rtl="0" eaLnBrk="1" fontAlgn="auto" latinLnBrk="0" hangingPunct="1">
+                        <a:lnSpc>
+                          <a:spcPct val="100000"/>
+                        </a:lnSpc>
+                        <a:spcBef>
+                          <a:spcPts val="0"/>
+                        </a:spcBef>
+                        <a:spcAft>
+                          <a:spcPts val="0"/>
+                        </a:spcAft>
+                        <a:buClrTx/>
+                        <a:buSzTx/>
+                        <a:buFontTx/>
+                        <a:buNone/>
+                        <a:tabLst/>
+                        <a:defRPr/>
+                      </a:pPr>
+                      <a:r>
+                        <a:rPr kumimoji="0" lang="en-US" sz="1200" b="0" i="0" u="none" strike="noStrike" kern="1200" cap="none" spc="0" normalizeH="0" baseline="0" noProof="0" dirty="0">
+                          <a:ln>
+                            <a:noFill/>
+                          </a:ln>
+                          <a:solidFill>
+                            <a:prstClr val="black"/>
+                          </a:solidFill>
+                          <a:effectLst/>
+                          <a:uLnTx/>
+                          <a:uFillTx/>
+                          <a:latin typeface="Calibri" panose="020F0502020204030204"/>
+                          <a:ea typeface="+mn-ea"/>
+                          <a:cs typeface="+mn-cs"/>
+                        </a:rPr>
+                        <a:t>9/14/2021</a:t>
+                      </a:r>
                     </a:p>
                   </a:txBody>
                   <a:tcPr anchor="ctr"/>
@@ -4316,7 +5473,34 @@
                     <a:lstStyle/>
                     <a:p>
                       <a:pPr algn="ctr"/>
-                      <a:endParaRPr lang="en-US" sz="1400" dirty="0"/>
+                      <a:r>
+                        <a:rPr lang="en-US" sz="1200" b="0" i="0" kern="1200" dirty="0">
+                          <a:solidFill>
+                            <a:schemeClr val="dk1"/>
+                          </a:solidFill>
+                          <a:effectLst/>
+                          <a:latin typeface="+mn-lt"/>
+                          <a:ea typeface="+mn-ea"/>
+                          <a:cs typeface="+mn-cs"/>
+                        </a:rPr>
+                        <a:t>seemann.eastus.cloudapp.azure.com</a:t>
+                      </a:r>
+                    </a:p>
+                    <a:p>
+                      <a:pPr algn="ctr"/>
+                      <a:r>
+                        <a:rPr lang="en-US" sz="1200" b="0" i="0" kern="1200" dirty="0">
+                          <a:solidFill>
+                            <a:schemeClr val="dk1"/>
+                          </a:solidFill>
+                          <a:effectLst/>
+                          <a:latin typeface="+mn-lt"/>
+                          <a:ea typeface="+mn-ea"/>
+                          <a:cs typeface="+mn-cs"/>
+                        </a:rPr>
+                        <a:t>13.72.104.178</a:t>
+                      </a:r>
+                      <a:endParaRPr lang="en-US" sz="1200" dirty="0"/>
                     </a:p>
                   </a:txBody>
                   <a:tcPr anchor="ctr"/>
@@ -4326,8 +5510,57 @@
                     <a:bodyPr/>
                     <a:lstStyle/>
                     <a:p>
-                      <a:pPr algn="ctr"/>
-                      <a:endParaRPr lang="en-US" sz="1400" dirty="0"/>
+                      <a:pPr marL="0" marR="0" lvl="0" indent="0" algn="ctr" defTabSz="914400" rtl="0" eaLnBrk="1" fontAlgn="auto" latinLnBrk="0" hangingPunct="1">
+                        <a:lnSpc>
+                          <a:spcPct val="100000"/>
+                        </a:lnSpc>
+                        <a:spcBef>
+                          <a:spcPts val="0"/>
+                        </a:spcBef>
+                        <a:spcAft>
+                          <a:spcPts val="0"/>
+                        </a:spcAft>
+                        <a:buClrTx/>
+                        <a:buSzTx/>
+                        <a:buFontTx/>
+                        <a:buNone/>
+                        <a:tabLst/>
+                        <a:defRPr/>
+                      </a:pPr>
+                      <a:r>
+                        <a:rPr kumimoji="0" lang="en-US" sz="1200" b="0" i="0" u="none" strike="noStrike" kern="1200" cap="none" spc="0" normalizeH="0" baseline="0" noProof="0" dirty="0" err="1">
+                          <a:ln>
+                            <a:noFill/>
+                          </a:ln>
+                          <a:solidFill>
+                            <a:prstClr val="black"/>
+                          </a:solidFill>
+                          <a:effectLst/>
+                          <a:uLnTx/>
+                          <a:uFillTx/>
+                          <a:latin typeface="Calibri" panose="020F0502020204030204"/>
+                          <a:ea typeface="+mn-ea"/>
+                          <a:cs typeface="+mn-cs"/>
+                        </a:rPr>
+                        <a:t>dlcc</a:t>
+                      </a:r>
+                      <a:r>
+                        <a:rPr kumimoji="0" lang="en-US" sz="1200" b="0" i="0" u="none" strike="noStrike" kern="1200" cap="none" spc="0" normalizeH="0" baseline="0" noProof="0" dirty="0">
+                          <a:ln>
+                            <a:noFill/>
+                          </a:ln>
+                          <a:solidFill>
+                            <a:prstClr val="black"/>
+                          </a:solidFill>
+                          <a:effectLst/>
+                          <a:uLnTx/>
+                          <a:uFillTx/>
+                          <a:latin typeface="Calibri" panose="020F0502020204030204"/>
+                          <a:ea typeface="+mn-ea"/>
+                          <a:cs typeface="+mn-cs"/>
+                        </a:rPr>
+                        <a:t>, dlcc789)_+dlcc789)_+</a:t>
+                      </a:r>
                     </a:p>
                   </a:txBody>
                   <a:tcPr anchor="ctr"/>
@@ -4337,8 +5570,40 @@
                     <a:bodyPr/>
                     <a:lstStyle/>
                     <a:p>
-                      <a:pPr algn="ctr"/>
-                      <a:endParaRPr lang="en-US" sz="1400" dirty="0"/>
+                      <a:pPr marL="0" marR="0" lvl="0" indent="0" algn="ctr" defTabSz="914400" rtl="0" eaLnBrk="1" fontAlgn="auto" latinLnBrk="0" hangingPunct="1">
+                        <a:lnSpc>
+                          <a:spcPct val="100000"/>
+                        </a:lnSpc>
+                        <a:spcBef>
+                          <a:spcPts val="0"/>
+                        </a:spcBef>
+                        <a:spcAft>
+                          <a:spcPts val="0"/>
+                        </a:spcAft>
+                        <a:buClrTx/>
+                        <a:buSzTx/>
+                        <a:buFontTx/>
+                        <a:buNone/>
+                        <a:tabLst/>
+                        <a:defRPr/>
+                      </a:pPr>
+                      <a:r>
+                        <a:rPr kumimoji="0" lang="en-US" sz="1200" b="0" i="0" u="none" strike="noStrike" kern="1200" cap="none" spc="0" normalizeH="0" baseline="0" noProof="0" dirty="0">
+                          <a:ln>
+                            <a:noFill/>
+                          </a:ln>
+                          <a:solidFill>
+                            <a:prstClr val="black"/>
+                          </a:solidFill>
+                          <a:effectLst/>
+                          <a:uLnTx/>
+                          <a:uFillTx/>
+                          <a:latin typeface="Calibri" panose="020F0502020204030204"/>
+                          <a:ea typeface="+mn-ea"/>
+                          <a:cs typeface="+mn-cs"/>
+                        </a:rPr>
+                        <a:t>9/14/2021</a:t>
+                      </a:r>
                     </a:p>
                   </a:txBody>
                   <a:tcPr anchor="ctr"/>
@@ -4346,210 +5611,6 @@
                 <a:extLst>
                   <a:ext uri="{0D108BD9-81ED-4DB2-BD59-A6C34878D82A}">
                     <a16:rowId xmlns:a16="http://schemas.microsoft.com/office/drawing/2014/main" val="2108622629"/>
-                  </a:ext>
-                </a:extLst>
-              </a:tr>
-              <a:tr h="336165">
-                <a:tc>
-                  <a:txBody>
-                    <a:bodyPr/>
-                    <a:lstStyle/>
-                    <a:p>
-                      <a:pPr algn="ctr"/>
-                      <a:endParaRPr lang="en-US" sz="1200" dirty="0"/>
-                    </a:p>
-                  </a:txBody>
-                  <a:tcPr anchor="ctr"/>
-                </a:tc>
-                <a:tc>
-                  <a:txBody>
-                    <a:bodyPr/>
-                    <a:lstStyle/>
-                    <a:p>
-                      <a:pPr algn="ctr"/>
-                      <a:endParaRPr lang="en-US" sz="1400" dirty="0"/>
-                    </a:p>
-                  </a:txBody>
-                  <a:tcPr anchor="ctr"/>
-                </a:tc>
-                <a:tc>
-                  <a:txBody>
-                    <a:bodyPr/>
-                    <a:lstStyle/>
-                    <a:p>
-                      <a:pPr algn="ctr"/>
-                      <a:endParaRPr lang="en-US" sz="1400" dirty="0"/>
-                    </a:p>
-                  </a:txBody>
-                  <a:tcPr anchor="ctr"/>
-                </a:tc>
-                <a:tc>
-                  <a:txBody>
-                    <a:bodyPr/>
-                    <a:lstStyle/>
-                    <a:p>
-                      <a:pPr algn="ctr"/>
-                      <a:endParaRPr lang="en-US" sz="1400" dirty="0"/>
-                    </a:p>
-                  </a:txBody>
-                  <a:tcPr anchor="ctr"/>
-                </a:tc>
-                <a:extLst>
-                  <a:ext uri="{0D108BD9-81ED-4DB2-BD59-A6C34878D82A}">
-                    <a16:rowId xmlns:a16="http://schemas.microsoft.com/office/drawing/2014/main" val="3783833160"/>
-                  </a:ext>
-                </a:extLst>
-              </a:tr>
-              <a:tr h="336165">
-                <a:tc>
-                  <a:txBody>
-                    <a:bodyPr/>
-                    <a:lstStyle/>
-                    <a:p>
-                      <a:pPr algn="ctr"/>
-                      <a:endParaRPr lang="en-US" sz="1200" dirty="0"/>
-                    </a:p>
-                  </a:txBody>
-                  <a:tcPr anchor="ctr"/>
-                </a:tc>
-                <a:tc>
-                  <a:txBody>
-                    <a:bodyPr/>
-                    <a:lstStyle/>
-                    <a:p>
-                      <a:pPr algn="ctr"/>
-                      <a:endParaRPr lang="en-US" sz="1400" dirty="0"/>
-                    </a:p>
-                  </a:txBody>
-                  <a:tcPr anchor="ctr"/>
-                </a:tc>
-                <a:tc>
-                  <a:txBody>
-                    <a:bodyPr/>
-                    <a:lstStyle/>
-                    <a:p>
-                      <a:pPr algn="ctr"/>
-                      <a:endParaRPr lang="en-US" sz="1400" dirty="0"/>
-                    </a:p>
-                  </a:txBody>
-                  <a:tcPr anchor="ctr"/>
-                </a:tc>
-                <a:tc>
-                  <a:txBody>
-                    <a:bodyPr/>
-                    <a:lstStyle/>
-                    <a:p>
-                      <a:pPr algn="ctr"/>
-                      <a:endParaRPr lang="en-US" sz="1400" dirty="0"/>
-                    </a:p>
-                  </a:txBody>
-                  <a:tcPr anchor="ctr"/>
-                </a:tc>
-                <a:extLst>
-                  <a:ext uri="{0D108BD9-81ED-4DB2-BD59-A6C34878D82A}">
-                    <a16:rowId xmlns:a16="http://schemas.microsoft.com/office/drawing/2014/main" val="1343713431"/>
-                  </a:ext>
-                </a:extLst>
-              </a:tr>
-              <a:tr h="336165">
-                <a:tc>
-                  <a:txBody>
-                    <a:bodyPr/>
-                    <a:lstStyle/>
-                    <a:p>
-                      <a:pPr algn="ctr"/>
-                      <a:endParaRPr lang="en-US" sz="1200" dirty="0"/>
-                    </a:p>
-                  </a:txBody>
-                  <a:tcPr anchor="ctr"/>
-                </a:tc>
-                <a:tc>
-                  <a:txBody>
-                    <a:bodyPr/>
-                    <a:lstStyle/>
-                    <a:p>
-                      <a:pPr algn="ctr"/>
-                      <a:endParaRPr lang="en-US" sz="1400" dirty="0"/>
-                    </a:p>
-                  </a:txBody>
-                  <a:tcPr anchor="ctr"/>
-                </a:tc>
-                <a:tc>
-                  <a:txBody>
-                    <a:bodyPr/>
-                    <a:lstStyle/>
-                    <a:p>
-                      <a:pPr algn="ctr"/>
-                      <a:endParaRPr lang="en-US" sz="1400" dirty="0"/>
-                    </a:p>
-                  </a:txBody>
-                  <a:tcPr anchor="ctr"/>
-                </a:tc>
-                <a:tc>
-                  <a:txBody>
-                    <a:bodyPr/>
-                    <a:lstStyle/>
-                    <a:p>
-                      <a:pPr algn="ctr"/>
-                      <a:endParaRPr lang="en-US" sz="1400" dirty="0"/>
-                    </a:p>
-                  </a:txBody>
-                  <a:tcPr anchor="ctr"/>
-                </a:tc>
-                <a:extLst>
-                  <a:ext uri="{0D108BD9-81ED-4DB2-BD59-A6C34878D82A}">
-                    <a16:rowId xmlns:a16="http://schemas.microsoft.com/office/drawing/2014/main" val="2256493600"/>
-                  </a:ext>
-                </a:extLst>
-              </a:tr>
-              <a:tr h="336165">
-                <a:tc>
-                  <a:txBody>
-                    <a:bodyPr/>
-                    <a:lstStyle/>
-                    <a:p>
-                      <a:pPr algn="ctr"/>
-                      <a:endParaRPr lang="en-US" sz="1200" dirty="0"/>
-                    </a:p>
-                  </a:txBody>
-                  <a:tcPr anchor="ctr"/>
-                </a:tc>
-                <a:tc>
-                  <a:txBody>
-                    <a:bodyPr/>
-                    <a:lstStyle/>
-                    <a:p>
-                      <a:pPr algn="ctr"/>
-                      <a:endParaRPr lang="en-US" sz="1400" dirty="0"/>
-                    </a:p>
-                  </a:txBody>
-                  <a:tcPr anchor="ctr"/>
-                </a:tc>
-                <a:tc>
-                  <a:txBody>
-                    <a:bodyPr/>
-                    <a:lstStyle/>
-                    <a:p>
-                      <a:pPr algn="ctr"/>
-                      <a:endParaRPr lang="en-US" sz="1400" dirty="0"/>
-                    </a:p>
-                  </a:txBody>
-                  <a:tcPr anchor="ctr"/>
-                </a:tc>
-                <a:tc>
-                  <a:txBody>
-                    <a:bodyPr/>
-                    <a:lstStyle/>
-                    <a:p>
-                      <a:pPr algn="ctr"/>
-                      <a:endParaRPr lang="en-US" sz="1400" dirty="0"/>
-                    </a:p>
-                  </a:txBody>
-                  <a:tcPr anchor="ctr"/>
-                </a:tc>
-                <a:extLst>
-                  <a:ext uri="{0D108BD9-81ED-4DB2-BD59-A6C34878D82A}">
-                    <a16:rowId xmlns:a16="http://schemas.microsoft.com/office/drawing/2014/main" val="968850379"/>
                   </a:ext>
                 </a:extLst>
               </a:tr>

</xml_diff>